<commit_message>
Minor changes for presentation.
</commit_message>
<xml_diff>
--- a/MatsonW_FluentC.pptx
+++ b/MatsonW_FluentC.pptx
@@ -8,10 +8,9 @@
     <p:sldId id="256" r:id="rId2"/>
     <p:sldId id="260" r:id="rId3"/>
     <p:sldId id="261" r:id="rId4"/>
-    <p:sldId id="257" r:id="rId5"/>
-    <p:sldId id="258" r:id="rId6"/>
-    <p:sldId id="259" r:id="rId7"/>
-    <p:sldId id="262" r:id="rId8"/>
+    <p:sldId id="258" r:id="rId5"/>
+    <p:sldId id="259" r:id="rId6"/>
+    <p:sldId id="257" r:id="rId7"/>
   </p:sldIdLst>
   <p:sldSz cx="9144000" cy="6858000" type="screen4x3"/>
   <p:notesSz cx="6858000" cy="9144000"/>
@@ -498,7 +497,7 @@
             <a:fld id="{65EACD11-42D3-49C9-9C09-7DDBF2F1645A}" type="datetimeFigureOut">
               <a:rPr lang="en-US" smtClean="0"/>
               <a:pPr/>
-              <a:t>07-May-12</a:t>
+              <a:t>09-May-12</a:t>
             </a:fld>
             <a:endParaRPr lang="en-US"/>
           </a:p>
@@ -552,6 +551,9 @@
   <p:clrMapOvr>
     <a:overrideClrMapping bg1="dk1" tx1="lt1" bg2="dk2" tx2="lt2" accent1="accent1" accent2="accent2" accent3="accent3" accent4="accent4" accent5="accent5" accent6="accent6" hlink="hlink" folHlink="folHlink"/>
   </p:clrMapOvr>
+  <p:transition>
+    <p:fade thruBlk="1"/>
+  </p:transition>
 </p:sldLayout>
 </file>
 
@@ -665,7 +667,7 @@
             <a:fld id="{65EACD11-42D3-49C9-9C09-7DDBF2F1645A}" type="datetimeFigureOut">
               <a:rPr lang="en-US" smtClean="0"/>
               <a:pPr/>
-              <a:t>07-May-12</a:t>
+              <a:t>09-May-12</a:t>
             </a:fld>
             <a:endParaRPr lang="en-US"/>
           </a:p>
@@ -719,6 +721,9 @@
   <p:clrMapOvr>
     <a:masterClrMapping/>
   </p:clrMapOvr>
+  <p:transition>
+    <p:fade thruBlk="1"/>
+  </p:transition>
 </p:sldLayout>
 </file>
 
@@ -842,7 +847,7 @@
             <a:fld id="{65EACD11-42D3-49C9-9C09-7DDBF2F1645A}" type="datetimeFigureOut">
               <a:rPr lang="en-US" smtClean="0"/>
               <a:pPr/>
-              <a:t>07-May-12</a:t>
+              <a:t>09-May-12</a:t>
             </a:fld>
             <a:endParaRPr lang="en-US"/>
           </a:p>
@@ -896,6 +901,9 @@
   <p:clrMapOvr>
     <a:masterClrMapping/>
   </p:clrMapOvr>
+  <p:transition>
+    <p:fade thruBlk="1"/>
+  </p:transition>
 </p:sldLayout>
 </file>
 
@@ -1013,7 +1021,7 @@
             <a:fld id="{65EACD11-42D3-49C9-9C09-7DDBF2F1645A}" type="datetimeFigureOut">
               <a:rPr lang="en-US" smtClean="0"/>
               <a:pPr/>
-              <a:t>07-May-12</a:t>
+              <a:t>09-May-12</a:t>
             </a:fld>
             <a:endParaRPr lang="en-US"/>
           </a:p>
@@ -1067,6 +1075,9 @@
   <p:clrMapOvr>
     <a:masterClrMapping/>
   </p:clrMapOvr>
+  <p:transition>
+    <p:fade thruBlk="1"/>
+  </p:transition>
 </p:sldLayout>
 </file>
 
@@ -1470,7 +1481,7 @@
             <a:fld id="{65EACD11-42D3-49C9-9C09-7DDBF2F1645A}" type="datetimeFigureOut">
               <a:rPr lang="en-US" smtClean="0"/>
               <a:pPr/>
-              <a:t>07-May-12</a:t>
+              <a:t>09-May-12</a:t>
             </a:fld>
             <a:endParaRPr lang="en-US"/>
           </a:p>
@@ -1524,6 +1535,9 @@
   <p:clrMapOvr>
     <a:overrideClrMapping bg1="dk1" tx1="lt1" bg2="dk2" tx2="lt2" accent1="accent1" accent2="accent2" accent3="accent3" accent4="accent4" accent5="accent5" accent6="accent6" hlink="hlink" folHlink="folHlink"/>
   </p:clrMapOvr>
+  <p:transition>
+    <p:fade thruBlk="1"/>
+  </p:transition>
 </p:sldLayout>
 </file>
 
@@ -1736,7 +1750,7 @@
             <a:fld id="{65EACD11-42D3-49C9-9C09-7DDBF2F1645A}" type="datetimeFigureOut">
               <a:rPr lang="en-US" smtClean="0"/>
               <a:pPr/>
-              <a:t>07-May-12</a:t>
+              <a:t>09-May-12</a:t>
             </a:fld>
             <a:endParaRPr lang="en-US"/>
           </a:p>
@@ -1790,6 +1804,9 @@
   <p:clrMapOvr>
     <a:masterClrMapping/>
   </p:clrMapOvr>
+  <p:transition>
+    <p:fade thruBlk="1"/>
+  </p:transition>
 </p:sldLayout>
 </file>
 
@@ -2112,7 +2129,7 @@
             <a:fld id="{65EACD11-42D3-49C9-9C09-7DDBF2F1645A}" type="datetimeFigureOut">
               <a:rPr lang="en-US" smtClean="0"/>
               <a:pPr/>
-              <a:t>07-May-12</a:t>
+              <a:t>09-May-12</a:t>
             </a:fld>
             <a:endParaRPr lang="en-US"/>
           </a:p>
@@ -2166,6 +2183,9 @@
   <p:clrMapOvr>
     <a:masterClrMapping/>
   </p:clrMapOvr>
+  <p:transition>
+    <p:fade thruBlk="1"/>
+  </p:transition>
 </p:sldLayout>
 </file>
 
@@ -2236,7 +2256,7 @@
             <a:fld id="{65EACD11-42D3-49C9-9C09-7DDBF2F1645A}" type="datetimeFigureOut">
               <a:rPr lang="en-US" smtClean="0"/>
               <a:pPr/>
-              <a:t>07-May-12</a:t>
+              <a:t>09-May-12</a:t>
             </a:fld>
             <a:endParaRPr lang="en-US"/>
           </a:p>
@@ -2290,6 +2310,9 @@
   <p:clrMapOvr>
     <a:masterClrMapping/>
   </p:clrMapOvr>
+  <p:transition>
+    <p:fade thruBlk="1"/>
+  </p:transition>
 </p:sldLayout>
 </file>
 
@@ -2328,7 +2351,7 @@
             <a:fld id="{65EACD11-42D3-49C9-9C09-7DDBF2F1645A}" type="datetimeFigureOut">
               <a:rPr lang="en-US" smtClean="0"/>
               <a:pPr/>
-              <a:t>07-May-12</a:t>
+              <a:t>09-May-12</a:t>
             </a:fld>
             <a:endParaRPr lang="en-US"/>
           </a:p>
@@ -2382,6 +2405,9 @@
   <p:clrMapOvr>
     <a:masterClrMapping/>
   </p:clrMapOvr>
+  <p:transition>
+    <p:fade thruBlk="1"/>
+  </p:transition>
 </p:sldLayout>
 </file>
 
@@ -2579,7 +2605,7 @@
             <a:fld id="{65EACD11-42D3-49C9-9C09-7DDBF2F1645A}" type="datetimeFigureOut">
               <a:rPr lang="en-US" smtClean="0"/>
               <a:pPr/>
-              <a:t>07-May-12</a:t>
+              <a:t>09-May-12</a:t>
             </a:fld>
             <a:endParaRPr lang="en-US"/>
           </a:p>
@@ -2638,6 +2664,9 @@
   <p:clrMapOvr>
     <a:masterClrMapping/>
   </p:clrMapOvr>
+  <p:transition>
+    <p:fade thruBlk="1"/>
+  </p:transition>
 </p:sldLayout>
 </file>
 
@@ -2840,7 +2869,7 @@
             <a:fld id="{65EACD11-42D3-49C9-9C09-7DDBF2F1645A}" type="datetimeFigureOut">
               <a:rPr lang="en-US" smtClean="0"/>
               <a:pPr/>
-              <a:t>07-May-12</a:t>
+              <a:t>09-May-12</a:t>
             </a:fld>
             <a:endParaRPr lang="en-US"/>
           </a:p>
@@ -2894,6 +2923,9 @@
   <p:clrMapOvr>
     <a:masterClrMapping/>
   </p:clrMapOvr>
+  <p:transition>
+    <p:fade thruBlk="1"/>
+  </p:transition>
 </p:sldLayout>
 </file>
 
@@ -3246,7 +3278,7 @@
             <a:fld id="{65EACD11-42D3-49C9-9C09-7DDBF2F1645A}" type="datetimeFigureOut">
               <a:rPr lang="en-US" smtClean="0"/>
               <a:pPr/>
-              <a:t>07-May-12</a:t>
+              <a:t>09-May-12</a:t>
             </a:fld>
             <a:endParaRPr lang="en-US"/>
           </a:p>
@@ -3347,6 +3379,9 @@
     <p:sldLayoutId id="2147483682" r:id="rId10"/>
     <p:sldLayoutId id="2147483683" r:id="rId11"/>
   </p:sldLayoutIdLst>
+  <p:transition>
+    <p:fade thruBlk="1"/>
+  </p:transition>
   <p:txStyles>
     <p:titleStyle>
       <a:lvl1pPr algn="l" rtl="0" eaLnBrk="1" latinLnBrk="0" hangingPunct="1">
@@ -3706,6 +3741,9 @@
   <p:clrMapOvr>
     <a:masterClrMapping/>
   </p:clrMapOvr>
+  <p:transition>
+    <p:fade thruBlk="1"/>
+  </p:transition>
   <p:timing>
     <p:tnLst>
       <p:par>
@@ -3785,27 +3823,56 @@
           <a:p>
             <a:r>
               <a:rPr lang="en-US" dirty="0" smtClean="0"/>
-              <a:t>Nagging </a:t>
-            </a:r>
+              <a:t>Five-week timeline</a:t>
+            </a:r>
+          </a:p>
+          <a:p>
             <a:r>
               <a:rPr lang="en-US" dirty="0" smtClean="0"/>
-              <a:t>Siblings</a:t>
-            </a:r>
-          </a:p>
-          <a:p>
+              <a:t>Number </a:t>
+            </a:r>
             <a:r>
               <a:rPr lang="en-US" dirty="0" smtClean="0"/>
-              <a:t>Number of language writers</a:t>
+              <a:t>of language writers</a:t>
             </a:r>
             <a:endParaRPr lang="en-US" dirty="0"/>
           </a:p>
         </p:txBody>
       </p:sp>
+      <p:pic>
+        <p:nvPicPr>
+          <p:cNvPr id="1026" name="Picture 2" descr="C:\Users\wmatson\AppData\Local\Microsoft\Windows\Temporary Internet Files\Content.IE5\FUVJ8F0Z\MC900441902[1].wmf"/>
+          <p:cNvPicPr>
+            <a:picLocks noChangeAspect="1" noChangeArrowheads="1"/>
+          </p:cNvPicPr>
+          <p:nvPr/>
+        </p:nvPicPr>
+        <p:blipFill>
+          <a:blip r:embed="rId2" cstate="print"/>
+          <a:srcRect/>
+          <a:stretch>
+            <a:fillRect/>
+          </a:stretch>
+        </p:blipFill>
+        <p:spPr bwMode="auto">
+          <a:xfrm>
+            <a:off x="6781800" y="4419600"/>
+            <a:ext cx="1447800" cy="1710762"/>
+          </a:xfrm>
+          <a:prstGeom prst="rect">
+            <a:avLst/>
+          </a:prstGeom>
+          <a:noFill/>
+        </p:spPr>
+      </p:pic>
     </p:spTree>
   </p:cSld>
   <p:clrMapOvr>
     <a:masterClrMapping/>
   </p:clrMapOvr>
+  <p:transition>
+    <p:fade thruBlk="1"/>
+  </p:transition>
   <p:timing>
     <p:tnLst>
       <p:par>
@@ -3850,7 +3917,11 @@
           <a:p>
             <a:r>
               <a:rPr lang="en-US" dirty="0" smtClean="0"/>
-              <a:t>Language Overview</a:t>
+              <a:t>Language </a:t>
+            </a:r>
+            <a:r>
+              <a:rPr lang="en-US" dirty="0" smtClean="0"/>
+              <a:t>Requirements</a:t>
             </a:r>
             <a:endParaRPr lang="en-US" dirty="0"/>
           </a:p>
@@ -3879,20 +3950,9 @@
           <a:p>
             <a:r>
               <a:rPr lang="en-US" dirty="0" smtClean="0"/>
-              <a:t>Expression Evaluation</a:t>
-            </a:r>
-          </a:p>
-          <a:p>
-            <a:r>
-              <a:rPr lang="en-US" dirty="0" smtClean="0"/>
-              <a:t>Non-Valued Functions</a:t>
-            </a:r>
-          </a:p>
-          <a:p>
-            <a:r>
-              <a:rPr lang="en-US" dirty="0" smtClean="0"/>
-              <a:t>Valued Functions</a:t>
-            </a:r>
+              <a:t>Function Management</a:t>
+            </a:r>
+            <a:endParaRPr lang="en-US" dirty="0" smtClean="0"/>
           </a:p>
           <a:p>
             <a:r>
@@ -3903,7 +3963,23 @@
           <a:p>
             <a:r>
               <a:rPr lang="en-US" dirty="0" smtClean="0"/>
-              <a:t>Looping Statements</a:t>
+              <a:t>Looping </a:t>
+            </a:r>
+            <a:r>
+              <a:rPr lang="en-US" dirty="0" smtClean="0"/>
+              <a:t>Statements</a:t>
+            </a:r>
+          </a:p>
+          <a:p>
+            <a:r>
+              <a:rPr lang="en-US" dirty="0" smtClean="0"/>
+              <a:t>Arithmetical Operations</a:t>
+            </a:r>
+          </a:p>
+          <a:p>
+            <a:r>
+              <a:rPr lang="en-US" dirty="0" smtClean="0"/>
+              <a:t>Statement Execution</a:t>
             </a:r>
             <a:endParaRPr lang="en-US" dirty="0"/>
           </a:p>
@@ -3914,6 +3990,9 @@
   <p:clrMapOvr>
     <a:masterClrMapping/>
   </p:clrMapOvr>
+  <p:transition>
+    <p:fade thruBlk="1"/>
+  </p:transition>
   <p:timing>
     <p:tnLst>
       <p:par>
@@ -3951,31 +4030,95 @@
             <p:ph type="title"/>
           </p:nvPr>
         </p:nvSpPr>
-        <p:spPr>
+        <p:spPr/>
+        <p:txBody>
+          <a:bodyPr/>
+          <a:lstStyle/>
+          <a:p>
+            <a:r>
+              <a:rPr lang="en-US" dirty="0" smtClean="0"/>
+              <a:t>Difficulties</a:t>
+            </a:r>
+            <a:endParaRPr lang="en-US" dirty="0"/>
+          </a:p>
+        </p:txBody>
+      </p:sp>
+      <p:sp>
+        <p:nvSpPr>
+          <p:cNvPr id="3" name="Content Placeholder 2"/>
+          <p:cNvSpPr>
+            <a:spLocks noGrp="1"/>
+          </p:cNvSpPr>
+          <p:nvPr>
+            <p:ph idx="1"/>
+          </p:nvPr>
+        </p:nvSpPr>
+        <p:spPr/>
+        <p:txBody>
+          <a:bodyPr/>
+          <a:lstStyle/>
+          <a:p>
+            <a:r>
+              <a:rPr lang="en-US" dirty="0" smtClean="0"/>
+              <a:t>Unconventional Approach</a:t>
+            </a:r>
+            <a:endParaRPr lang="en-US" dirty="0"/>
+          </a:p>
+          <a:p>
+            <a:r>
+              <a:rPr lang="en-US" dirty="0" smtClean="0"/>
+              <a:t>Speech Recognition Challenge</a:t>
+            </a:r>
+          </a:p>
+          <a:p>
+            <a:r>
+              <a:rPr lang="en-US" dirty="0" smtClean="0"/>
+              <a:t>Specification Flaws</a:t>
+            </a:r>
+          </a:p>
+        </p:txBody>
+      </p:sp>
+      <p:pic>
+        <p:nvPicPr>
+          <p:cNvPr id="4102" name="Picture 6" descr="https://encrypted-tbn0.google.com/images?q=tbn:ANd9GcRRYcGcRl5eNQqLu7tmn_smGlRw31J1nz3L3my_WwbifuY4FKJW"/>
+          <p:cNvPicPr>
+            <a:picLocks noChangeAspect="1" noChangeArrowheads="1"/>
+          </p:cNvPicPr>
+          <p:nvPr/>
+        </p:nvPicPr>
+        <p:blipFill>
+          <a:blip r:embed="rId2" cstate="print">
+            <a:lum contrast="-10000"/>
+          </a:blip>
+          <a:srcRect/>
+          <a:stretch>
+            <a:fillRect/>
+          </a:stretch>
+        </p:blipFill>
+        <p:spPr bwMode="auto">
           <a:xfrm>
-            <a:off x="457200" y="2606040"/>
-            <a:ext cx="8229600" cy="1143000"/>
+            <a:off x="5010150" y="3800475"/>
+            <a:ext cx="2381250" cy="1914525"/>
           </a:xfrm>
+          <a:prstGeom prst="rect">
+            <a:avLst/>
+          </a:prstGeom>
+          <a:ln>
+            <a:noFill/>
+          </a:ln>
+          <a:effectLst>
+            <a:softEdge rad="112500"/>
+          </a:effectLst>
         </p:spPr>
-        <p:txBody>
-          <a:bodyPr/>
-          <a:lstStyle/>
-          <a:p>
-            <a:r>
-              <a:rPr lang="en-US" dirty="0" smtClean="0">
-                <a:hlinkClick r:id="rId2" action="ppaction://program"/>
-              </a:rPr>
-              <a:t>Demonstration</a:t>
-            </a:r>
-            <a:endParaRPr lang="en-US" dirty="0"/>
-          </a:p>
-        </p:txBody>
-      </p:sp>
+      </p:pic>
     </p:spTree>
   </p:cSld>
   <p:clrMapOvr>
     <a:masterClrMapping/>
   </p:clrMapOvr>
+  <p:transition>
+    <p:fade thruBlk="1"/>
+  </p:transition>
   <p:timing>
     <p:tnLst>
       <p:par>
@@ -4020,7 +4163,7 @@
           <a:p>
             <a:r>
               <a:rPr lang="en-US" dirty="0" smtClean="0"/>
-              <a:t>Difficulties</a:t>
+              <a:t>Possibilities</a:t>
             </a:r>
             <a:endParaRPr lang="en-US" dirty="0"/>
           </a:p>
@@ -4043,29 +4186,87 @@
           <a:p>
             <a:r>
               <a:rPr lang="en-US" dirty="0" smtClean="0"/>
-              <a:t>Unconventional Approach</a:t>
+              <a:t>Easier training process for programmers</a:t>
+            </a:r>
+          </a:p>
+          <a:p>
+            <a:r>
+              <a:rPr lang="en-US" dirty="0" smtClean="0"/>
+              <a:t>Programming utilities for non-programmers</a:t>
+            </a:r>
+          </a:p>
+          <a:p>
+            <a:r>
+              <a:rPr lang="en-US" dirty="0" err="1" smtClean="0"/>
+              <a:t>Pseudocode</a:t>
+            </a:r>
+            <a:r>
+              <a:rPr lang="en-US" dirty="0" smtClean="0"/>
+              <a:t> compilation</a:t>
+            </a:r>
+          </a:p>
+          <a:p>
+            <a:r>
+              <a:rPr lang="en-US" dirty="0" smtClean="0"/>
+              <a:t>Increased </a:t>
+            </a:r>
+            <a:r>
+              <a:rPr lang="en-US" dirty="0" err="1" smtClean="0"/>
+              <a:t>Commandability</a:t>
+            </a:r>
+            <a:r>
+              <a:rPr lang="en-US" dirty="0" smtClean="0"/>
+              <a:t> of machines</a:t>
+            </a:r>
+          </a:p>
+          <a:p>
+            <a:r>
+              <a:rPr lang="en-US" dirty="0" smtClean="0"/>
+              <a:t>Endless more!</a:t>
             </a:r>
             <a:endParaRPr lang="en-US" dirty="0"/>
           </a:p>
-          <a:p>
-            <a:r>
-              <a:rPr lang="en-US" dirty="0" smtClean="0"/>
-              <a:t>Speech Recognition Challenge</a:t>
-            </a:r>
-          </a:p>
-          <a:p>
-            <a:r>
-              <a:rPr lang="en-US" dirty="0" smtClean="0"/>
-              <a:t>Specification Flaws</a:t>
-            </a:r>
-          </a:p>
-        </p:txBody>
-      </p:sp>
+        </p:txBody>
+      </p:sp>
+      <p:pic>
+        <p:nvPicPr>
+          <p:cNvPr id="3078" name="Picture 6" descr="https://encrypted-tbn2.google.com/images?q=tbn:ANd9GcRQXsAzh1XZ06TX2vuNJUN6pj3CIys9M181x91UXjwhyI1yBVsvzA"/>
+          <p:cNvPicPr>
+            <a:picLocks noChangeAspect="1" noChangeArrowheads="1"/>
+          </p:cNvPicPr>
+          <p:nvPr/>
+        </p:nvPicPr>
+        <p:blipFill>
+          <a:blip r:embed="rId2" cstate="print"/>
+          <a:srcRect l="7143" t="7175" r="7143" b="6726"/>
+          <a:stretch>
+            <a:fillRect/>
+          </a:stretch>
+        </p:blipFill>
+        <p:spPr bwMode="auto">
+          <a:xfrm>
+            <a:off x="6172200" y="4419600"/>
+            <a:ext cx="1676400" cy="1676400"/>
+          </a:xfrm>
+          <a:prstGeom prst="ellipse">
+            <a:avLst/>
+          </a:prstGeom>
+          <a:ln>
+            <a:noFill/>
+          </a:ln>
+          <a:effectLst>
+            <a:softEdge rad="112500"/>
+          </a:effectLst>
+        </p:spPr>
+      </p:pic>
     </p:spTree>
   </p:cSld>
   <p:clrMapOvr>
     <a:masterClrMapping/>
   </p:clrMapOvr>
+  <p:transition>
+    <p:fade thruBlk="1"/>
+  </p:transition>
   <p:timing>
     <p:tnLst>
       <p:par>
@@ -4103,73 +4304,21 @@
             <p:ph type="title"/>
           </p:nvPr>
         </p:nvSpPr>
-        <p:spPr/>
-        <p:txBody>
-          <a:bodyPr/>
-          <a:lstStyle/>
-          <a:p>
-            <a:r>
-              <a:rPr lang="en-US" dirty="0" smtClean="0"/>
-              <a:t>Possibilities</a:t>
-            </a:r>
-            <a:endParaRPr lang="en-US" dirty="0"/>
-          </a:p>
-        </p:txBody>
-      </p:sp>
-      <p:sp>
-        <p:nvSpPr>
-          <p:cNvPr id="3" name="Content Placeholder 2"/>
-          <p:cNvSpPr>
-            <a:spLocks noGrp="1"/>
-          </p:cNvSpPr>
-          <p:nvPr>
-            <p:ph idx="1"/>
-          </p:nvPr>
-        </p:nvSpPr>
-        <p:spPr/>
-        <p:txBody>
-          <a:bodyPr/>
-          <a:lstStyle/>
-          <a:p>
-            <a:r>
-              <a:rPr lang="en-US" dirty="0" smtClean="0"/>
-              <a:t>Easier training process for programmers</a:t>
-            </a:r>
-          </a:p>
-          <a:p>
-            <a:r>
-              <a:rPr lang="en-US" dirty="0" smtClean="0"/>
-              <a:t>Programming utilities for non-programmers</a:t>
-            </a:r>
-          </a:p>
-          <a:p>
-            <a:r>
-              <a:rPr lang="en-US" dirty="0" err="1" smtClean="0"/>
-              <a:t>Pseudocode</a:t>
-            </a:r>
-            <a:r>
-              <a:rPr lang="en-US" dirty="0" smtClean="0"/>
-              <a:t> compilation</a:t>
-            </a:r>
-          </a:p>
-          <a:p>
-            <a:r>
-              <a:rPr lang="en-US" dirty="0" smtClean="0"/>
-              <a:t>Increased </a:t>
-            </a:r>
-            <a:r>
-              <a:rPr lang="en-US" dirty="0" err="1" smtClean="0"/>
-              <a:t>Commandability</a:t>
-            </a:r>
-            <a:r>
-              <a:rPr lang="en-US" dirty="0" smtClean="0"/>
-              <a:t> of machines</a:t>
-            </a:r>
-          </a:p>
-          <a:p>
-            <a:r>
-              <a:rPr lang="en-US" dirty="0" smtClean="0"/>
-              <a:t>Endless more!</a:t>
+        <p:spPr>
+          <a:xfrm>
+            <a:off x="457200" y="2606040"/>
+            <a:ext cx="8229600" cy="1143000"/>
+          </a:xfrm>
+        </p:spPr>
+        <p:txBody>
+          <a:bodyPr/>
+          <a:lstStyle/>
+          <a:p>
+            <a:r>
+              <a:rPr lang="en-US" dirty="0" smtClean="0">
+                <a:hlinkClick r:id="rId2" action="ppaction://program"/>
+              </a:rPr>
+              <a:t>Demonstration</a:t>
             </a:r>
             <a:endParaRPr lang="en-US" dirty="0"/>
           </a:p>
@@ -4180,61 +4329,9 @@
   <p:clrMapOvr>
     <a:masterClrMapping/>
   </p:clrMapOvr>
-  <p:timing>
-    <p:tnLst>
-      <p:par>
-        <p:cTn id="1" dur="indefinite" restart="never" nodeType="tmRoot"/>
-      </p:par>
-    </p:tnLst>
-  </p:timing>
-</p:sld>
-</file>
-
-<file path=ppt/slides/slide7.xml><?xml version="1.0" encoding="utf-8"?>
-<p:sld xmlns:a="http://schemas.openxmlformats.org/drawingml/2006/main" xmlns:r="http://schemas.openxmlformats.org/officeDocument/2006/relationships" xmlns:p="http://schemas.openxmlformats.org/presentationml/2006/main">
-  <p:cSld>
-    <p:spTree>
-      <p:nvGrpSpPr>
-        <p:cNvPr id="1" name=""/>
-        <p:cNvGrpSpPr/>
-        <p:nvPr/>
-      </p:nvGrpSpPr>
-      <p:grpSpPr>
-        <a:xfrm>
-          <a:off x="0" y="0"/>
-          <a:ext cx="0" cy="0"/>
-          <a:chOff x="0" y="0"/>
-          <a:chExt cx="0" cy="0"/>
-        </a:xfrm>
-      </p:grpSpPr>
-      <p:sp>
-        <p:nvSpPr>
-          <p:cNvPr id="2" name="Title 1"/>
-          <p:cNvSpPr>
-            <a:spLocks noGrp="1"/>
-          </p:cNvSpPr>
-          <p:nvPr>
-            <p:ph type="title"/>
-          </p:nvPr>
-        </p:nvSpPr>
-        <p:spPr/>
-        <p:txBody>
-          <a:bodyPr/>
-          <a:lstStyle/>
-          <a:p>
-            <a:r>
-              <a:rPr lang="en-US" dirty="0" smtClean="0"/>
-              <a:t>Questions?</a:t>
-            </a:r>
-            <a:endParaRPr lang="en-US" dirty="0"/>
-          </a:p>
-        </p:txBody>
-      </p:sp>
-    </p:spTree>
-  </p:cSld>
-  <p:clrMapOvr>
-    <a:masterClrMapping/>
-  </p:clrMapOvr>
+  <p:transition>
+    <p:fade thruBlk="1"/>
+  </p:transition>
   <p:timing>
     <p:tnLst>
       <p:par>

</xml_diff>